<commit_message>
Solution for exercise2 of intro to malloc and leaks edit
</commit_message>
<xml_diff>
--- a/modules/leaks/leaks.pptx
+++ b/modules/leaks/leaks.pptx
@@ -5,7 +5,7 @@
     <p:sldMasterId id="2147483660" r:id="rId1"/>
   </p:sldMasterIdLst>
   <p:notesMasterIdLst>
-    <p:notesMasterId r:id="rId47"/>
+    <p:notesMasterId r:id="rId48"/>
   </p:notesMasterIdLst>
   <p:sldIdLst>
     <p:sldId id="440" r:id="rId2"/>
@@ -37,22 +37,23 @@
     <p:sldId id="464" r:id="rId28"/>
     <p:sldId id="463" r:id="rId29"/>
     <p:sldId id="443" r:id="rId30"/>
-    <p:sldId id="470" r:id="rId31"/>
-    <p:sldId id="468" r:id="rId32"/>
-    <p:sldId id="469" r:id="rId33"/>
-    <p:sldId id="445" r:id="rId34"/>
-    <p:sldId id="471" r:id="rId35"/>
-    <p:sldId id="478" r:id="rId36"/>
-    <p:sldId id="465" r:id="rId37"/>
-    <p:sldId id="466" r:id="rId38"/>
-    <p:sldId id="484" r:id="rId39"/>
-    <p:sldId id="483" r:id="rId40"/>
-    <p:sldId id="472" r:id="rId41"/>
-    <p:sldId id="485" r:id="rId42"/>
-    <p:sldId id="479" r:id="rId43"/>
-    <p:sldId id="481" r:id="rId44"/>
-    <p:sldId id="480" r:id="rId45"/>
-    <p:sldId id="482" r:id="rId46"/>
+    <p:sldId id="486" r:id="rId31"/>
+    <p:sldId id="470" r:id="rId32"/>
+    <p:sldId id="468" r:id="rId33"/>
+    <p:sldId id="469" r:id="rId34"/>
+    <p:sldId id="445" r:id="rId35"/>
+    <p:sldId id="471" r:id="rId36"/>
+    <p:sldId id="478" r:id="rId37"/>
+    <p:sldId id="465" r:id="rId38"/>
+    <p:sldId id="466" r:id="rId39"/>
+    <p:sldId id="484" r:id="rId40"/>
+    <p:sldId id="483" r:id="rId41"/>
+    <p:sldId id="472" r:id="rId42"/>
+    <p:sldId id="485" r:id="rId43"/>
+    <p:sldId id="479" r:id="rId44"/>
+    <p:sldId id="481" r:id="rId45"/>
+    <p:sldId id="480" r:id="rId46"/>
+    <p:sldId id="482" r:id="rId47"/>
   </p:sldIdLst>
   <p:sldSz cx="9144000" cy="5143500" type="screen16x9"/>
   <p:notesSz cx="6858000" cy="9144000"/>
@@ -39789,7 +39790,7 @@
           <a:p>
             <a:fld id="{2DA23E8D-1792-1541-9147-970A8DD8A355}" type="datetimeFigureOut">
               <a:rPr lang="en-US" smtClean="0"/>
-              <a:t>5/27/21</a:t>
+              <a:t>7/19/21</a:t>
             </a:fld>
             <a:endParaRPr lang="en-US" dirty="0"/>
           </a:p>
@@ -40520,7 +40521,7 @@
                 <a:latin typeface="Calibri"/>
               </a:rPr>
               <a:pPr/>
-              <a:t>5/27/21</a:t>
+              <a:t>7/19/21</a:t>
             </a:fld>
             <a:endParaRPr lang="en-US" dirty="0">
               <a:solidFill>
@@ -40773,7 +40774,7 @@
                 <a:latin typeface="Calibri"/>
               </a:rPr>
               <a:pPr/>
-              <a:t>5/27/21</a:t>
+              <a:t>7/19/21</a:t>
             </a:fld>
             <a:endParaRPr lang="en-US" dirty="0">
               <a:solidFill>
@@ -40988,7 +40989,7 @@
                 <a:latin typeface="Calibri"/>
               </a:rPr>
               <a:pPr/>
-              <a:t>5/27/21</a:t>
+              <a:t>7/19/21</a:t>
             </a:fld>
             <a:endParaRPr lang="en-US" dirty="0">
               <a:solidFill>
@@ -41272,7 +41273,7 @@
                 <a:latin typeface="Calibri"/>
               </a:rPr>
               <a:pPr/>
-              <a:t>5/27/21</a:t>
+              <a:t>7/19/21</a:t>
             </a:fld>
             <a:endParaRPr lang="en-US" dirty="0">
               <a:solidFill>
@@ -41614,7 +41615,7 @@
                 <a:latin typeface="Calibri"/>
               </a:rPr>
               <a:pPr/>
-              <a:t>5/27/21</a:t>
+              <a:t>7/19/21</a:t>
             </a:fld>
             <a:endParaRPr lang="en-US" dirty="0">
               <a:solidFill>
@@ -41942,7 +41943,7 @@
                 <a:latin typeface="Calibri"/>
               </a:rPr>
               <a:pPr/>
-              <a:t>5/27/21</a:t>
+              <a:t>7/19/21</a:t>
             </a:fld>
             <a:endParaRPr lang="en-US" dirty="0">
               <a:solidFill>
@@ -42431,7 +42432,7 @@
                 <a:latin typeface="Calibri"/>
               </a:rPr>
               <a:pPr/>
-              <a:t>5/27/21</a:t>
+              <a:t>7/19/21</a:t>
             </a:fld>
             <a:endParaRPr lang="en-US" dirty="0">
               <a:solidFill>
@@ -42614,7 +42615,7 @@
                 <a:latin typeface="Calibri"/>
               </a:rPr>
               <a:pPr/>
-              <a:t>5/27/21</a:t>
+              <a:t>7/19/21</a:t>
             </a:fld>
             <a:endParaRPr lang="en-US" dirty="0">
               <a:solidFill>
@@ -42860,7 +42861,7 @@
                 <a:latin typeface="Calibri"/>
               </a:rPr>
               <a:pPr/>
-              <a:t>5/27/21</a:t>
+              <a:t>7/19/21</a:t>
             </a:fld>
             <a:endParaRPr lang="en-US" dirty="0">
               <a:solidFill>
@@ -43202,7 +43203,7 @@
                 <a:latin typeface="Calibri"/>
               </a:rPr>
               <a:pPr/>
-              <a:t>5/27/21</a:t>
+              <a:t>7/19/21</a:t>
             </a:fld>
             <a:endParaRPr lang="en-US" dirty="0">
               <a:solidFill>
@@ -43494,7 +43495,7 @@
                 <a:latin typeface="Calibri"/>
               </a:rPr>
               <a:pPr/>
-              <a:t>5/27/21</a:t>
+              <a:t>7/19/21</a:t>
             </a:fld>
             <a:endParaRPr lang="en-US" dirty="0">
               <a:solidFill>
@@ -43744,7 +43745,7 @@
                 <a:latin typeface="Calibri"/>
               </a:rPr>
               <a:pPr defTabSz="914400"/>
-              <a:t>5/27/21</a:t>
+              <a:t>7/19/21</a:t>
             </a:fld>
             <a:endParaRPr lang="en-US" dirty="0">
               <a:solidFill>
@@ -47642,6 +47643,144 @@
           <p:cNvPr id="2" name="Title 1">
             <a:extLst>
               <a:ext uri="{FF2B5EF4-FFF2-40B4-BE49-F238E27FC236}">
+                <a16:creationId xmlns:a16="http://schemas.microsoft.com/office/drawing/2014/main" id="{E7A807EF-75C9-2046-99DF-AEFD3EFAEEBF}"/>
+              </a:ext>
+            </a:extLst>
+          </p:cNvPr>
+          <p:cNvSpPr>
+            <a:spLocks noGrp="1"/>
+          </p:cNvSpPr>
+          <p:nvPr>
+            <p:ph type="title"/>
+          </p:nvPr>
+        </p:nvSpPr>
+        <p:spPr/>
+        <p:txBody>
+          <a:bodyPr/>
+          <a:lstStyle/>
+          <a:p>
+            <a:r>
+              <a:rPr lang="en-US"/>
+              <a:t>Random Techniques – TODO </a:t>
+            </a:r>
+            <a:endParaRPr lang="en-US" dirty="0"/>
+          </a:p>
+        </p:txBody>
+      </p:sp>
+      <p:sp>
+        <p:nvSpPr>
+          <p:cNvPr id="3" name="Content Placeholder 2">
+            <a:extLst>
+              <a:ext uri="{FF2B5EF4-FFF2-40B4-BE49-F238E27FC236}">
+                <a16:creationId xmlns:a16="http://schemas.microsoft.com/office/drawing/2014/main" id="{ED38EFED-CD05-BE4B-8E94-A6308E3B31F9}"/>
+              </a:ext>
+            </a:extLst>
+          </p:cNvPr>
+          <p:cNvSpPr>
+            <a:spLocks noGrp="1"/>
+          </p:cNvSpPr>
+          <p:nvPr>
+            <p:ph idx="1"/>
+          </p:nvPr>
+        </p:nvSpPr>
+        <p:spPr/>
+        <p:txBody>
+          <a:bodyPr/>
+          <a:lstStyle/>
+          <a:p>
+            <a:r>
+              <a:rPr lang="en-US" dirty="0"/>
+              <a:t>Relative offsets to important known locations: </a:t>
+            </a:r>
+          </a:p>
+          <a:p>
+            <a:pPr lvl="1"/>
+            <a:r>
+              <a:rPr lang="en-US" dirty="0">
+                <a:hlinkClick r:id="rId2"/>
+              </a:rPr>
+              <a:t>https://secret.club/2021/01/14/vbox-escape.html</a:t>
+            </a:r>
+            <a:r>
+              <a:rPr lang="en-US" dirty="0"/>
+              <a:t> </a:t>
+            </a:r>
+          </a:p>
+          <a:p>
+            <a:r>
+              <a:rPr lang="en-US" dirty="0"/>
+              <a:t>Filling in holes: </a:t>
+            </a:r>
+          </a:p>
+          <a:p>
+            <a:pPr lvl="1"/>
+            <a:r>
+              <a:rPr lang="en-US" dirty="0">
+                <a:hlinkClick r:id="rId3"/>
+              </a:rPr>
+              <a:t>https://google.github.io/security-research/pocs/linux/cve-2021-22555/writeup.html</a:t>
+            </a:r>
+            <a:r>
+              <a:rPr lang="en-US" dirty="0"/>
+              <a:t> </a:t>
+            </a:r>
+          </a:p>
+          <a:p>
+            <a:r>
+              <a:rPr lang="en-US" dirty="0"/>
+              <a:t>Spraying for object alignment:  </a:t>
+            </a:r>
+          </a:p>
+          <a:p>
+            <a:pPr lvl="1"/>
+            <a:r>
+              <a:rPr lang="en-US" dirty="0">
+                <a:hlinkClick r:id="rId4"/>
+              </a:rPr>
+              <a:t>https://www.longterm.io/cve-2020-0423.html</a:t>
+            </a:r>
+            <a:r>
+              <a:rPr lang="en-US" dirty="0"/>
+              <a:t> </a:t>
+            </a:r>
+          </a:p>
+        </p:txBody>
+      </p:sp>
+    </p:spTree>
+    <p:extLst>
+      <p:ext uri="{BB962C8B-B14F-4D97-AF65-F5344CB8AC3E}">
+        <p14:creationId xmlns:p14="http://schemas.microsoft.com/office/powerpoint/2010/main" val="4059226325"/>
+      </p:ext>
+    </p:extLst>
+  </p:cSld>
+  <p:clrMapOvr>
+    <a:masterClrMapping/>
+  </p:clrMapOvr>
+</p:sld>
+</file>
+
+<file path=ppt/slides/slide31.xml><?xml version="1.0" encoding="utf-8"?>
+<p:sld xmlns:a="http://schemas.openxmlformats.org/drawingml/2006/main" xmlns:r="http://schemas.openxmlformats.org/officeDocument/2006/relationships" xmlns:p="http://schemas.openxmlformats.org/presentationml/2006/main">
+  <p:cSld>
+    <p:spTree>
+      <p:nvGrpSpPr>
+        <p:cNvPr id="1" name=""/>
+        <p:cNvGrpSpPr/>
+        <p:nvPr/>
+      </p:nvGrpSpPr>
+      <p:grpSpPr>
+        <a:xfrm>
+          <a:off x="0" y="0"/>
+          <a:ext cx="0" cy="0"/>
+          <a:chOff x="0" y="0"/>
+          <a:chExt cx="0" cy="0"/>
+        </a:xfrm>
+      </p:grpSpPr>
+      <p:sp>
+        <p:nvSpPr>
+          <p:cNvPr id="2" name="Title 1">
+            <a:extLst>
+              <a:ext uri="{FF2B5EF4-FFF2-40B4-BE49-F238E27FC236}">
                 <a16:creationId xmlns:a16="http://schemas.microsoft.com/office/drawing/2014/main" id="{991BDB53-B612-584F-A42A-224F9B7FFA98}"/>
               </a:ext>
             </a:extLst>
@@ -47720,7 +47859,7 @@
 </p:sld>
 </file>
 
-<file path=ppt/slides/slide31.xml><?xml version="1.0" encoding="utf-8"?>
+<file path=ppt/slides/slide32.xml><?xml version="1.0" encoding="utf-8"?>
 <p:sld xmlns:a="http://schemas.openxmlformats.org/drawingml/2006/main" xmlns:r="http://schemas.openxmlformats.org/officeDocument/2006/relationships" xmlns:p="http://schemas.openxmlformats.org/presentationml/2006/main">
   <p:cSld>
     <p:spTree>
@@ -48121,7 +48260,7 @@
 </p:sld>
 </file>
 
-<file path=ppt/slides/slide32.xml><?xml version="1.0" encoding="utf-8"?>
+<file path=ppt/slides/slide33.xml><?xml version="1.0" encoding="utf-8"?>
 <p:sld xmlns:a="http://schemas.openxmlformats.org/drawingml/2006/main" xmlns:r="http://schemas.openxmlformats.org/officeDocument/2006/relationships" xmlns:p="http://schemas.openxmlformats.org/presentationml/2006/main">
   <p:cSld>
     <p:spTree>
@@ -48385,7 +48524,7 @@
 </p:sld>
 </file>
 
-<file path=ppt/slides/slide33.xml><?xml version="1.0" encoding="utf-8"?>
+<file path=ppt/slides/slide34.xml><?xml version="1.0" encoding="utf-8"?>
 <p:sld xmlns:a="http://schemas.openxmlformats.org/drawingml/2006/main" xmlns:r="http://schemas.openxmlformats.org/officeDocument/2006/relationships" xmlns:p="http://schemas.openxmlformats.org/presentationml/2006/main">
   <p:cSld>
     <p:spTree>
@@ -48481,7 +48620,7 @@
 </p:sld>
 </file>
 
-<file path=ppt/slides/slide34.xml><?xml version="1.0" encoding="utf-8"?>
+<file path=ppt/slides/slide35.xml><?xml version="1.0" encoding="utf-8"?>
 <p:sld xmlns:a="http://schemas.openxmlformats.org/drawingml/2006/main" xmlns:r="http://schemas.openxmlformats.org/officeDocument/2006/relationships" xmlns:p="http://schemas.openxmlformats.org/presentationml/2006/main">
   <p:cSld>
     <p:spTree>
@@ -48577,7 +48716,7 @@
 </p:sld>
 </file>
 
-<file path=ppt/slides/slide35.xml><?xml version="1.0" encoding="utf-8"?>
+<file path=ppt/slides/slide36.xml><?xml version="1.0" encoding="utf-8"?>
 <p:sld xmlns:a="http://schemas.openxmlformats.org/drawingml/2006/main" xmlns:r="http://schemas.openxmlformats.org/officeDocument/2006/relationships" xmlns:p="http://schemas.openxmlformats.org/presentationml/2006/main">
   <p:cSld>
     <p:spTree>
@@ -48719,7 +48858,7 @@
 </p:sld>
 </file>
 
-<file path=ppt/slides/slide36.xml><?xml version="1.0" encoding="utf-8"?>
+<file path=ppt/slides/slide37.xml><?xml version="1.0" encoding="utf-8"?>
 <p:sld xmlns:a="http://schemas.openxmlformats.org/drawingml/2006/main" xmlns:r="http://schemas.openxmlformats.org/officeDocument/2006/relationships" xmlns:p="http://schemas.openxmlformats.org/presentationml/2006/main">
   <p:cSld>
     <p:spTree>
@@ -48876,7 +49015,7 @@
 </p:sld>
 </file>
 
-<file path=ppt/slides/slide37.xml><?xml version="1.0" encoding="utf-8"?>
+<file path=ppt/slides/slide38.xml><?xml version="1.0" encoding="utf-8"?>
 <p:sld xmlns:a="http://schemas.openxmlformats.org/drawingml/2006/main" xmlns:r="http://schemas.openxmlformats.org/officeDocument/2006/relationships" xmlns:p="http://schemas.openxmlformats.org/presentationml/2006/main">
   <p:cSld>
     <p:spTree>
@@ -49037,7 +49176,7 @@
 </p:sld>
 </file>
 
-<file path=ppt/slides/slide38.xml><?xml version="1.0" encoding="utf-8"?>
+<file path=ppt/slides/slide39.xml><?xml version="1.0" encoding="utf-8"?>
 <p:sld xmlns:a="http://schemas.openxmlformats.org/drawingml/2006/main" xmlns:r="http://schemas.openxmlformats.org/officeDocument/2006/relationships" xmlns:p="http://schemas.openxmlformats.org/presentationml/2006/main">
   <p:cSld>
     <p:spTree>
@@ -49242,7 +49381,98 @@
 </p:sld>
 </file>
 
-<file path=ppt/slides/slide39.xml><?xml version="1.0" encoding="utf-8"?>
+<file path=ppt/slides/slide4.xml><?xml version="1.0" encoding="utf-8"?>
+<p:sld xmlns:a="http://schemas.openxmlformats.org/drawingml/2006/main" xmlns:r="http://schemas.openxmlformats.org/officeDocument/2006/relationships" xmlns:p="http://schemas.openxmlformats.org/presentationml/2006/main">
+  <p:cSld>
+    <p:spTree>
+      <p:nvGrpSpPr>
+        <p:cNvPr id="1" name=""/>
+        <p:cNvGrpSpPr/>
+        <p:nvPr/>
+      </p:nvGrpSpPr>
+      <p:grpSpPr>
+        <a:xfrm>
+          <a:off x="0" y="0"/>
+          <a:ext cx="0" cy="0"/>
+          <a:chOff x="0" y="0"/>
+          <a:chExt cx="0" cy="0"/>
+        </a:xfrm>
+      </p:grpSpPr>
+      <p:sp>
+        <p:nvSpPr>
+          <p:cNvPr id="2" name="Title 1">
+            <a:extLst>
+              <a:ext uri="{FF2B5EF4-FFF2-40B4-BE49-F238E27FC236}">
+                <a16:creationId xmlns:a16="http://schemas.microsoft.com/office/drawing/2014/main" id="{1BDD0254-2F5D-5D4C-A0D7-2421174D5BB2}"/>
+              </a:ext>
+            </a:extLst>
+          </p:cNvPr>
+          <p:cNvSpPr>
+            <a:spLocks noGrp="1"/>
+          </p:cNvSpPr>
+          <p:nvPr>
+            <p:ph type="title"/>
+          </p:nvPr>
+        </p:nvSpPr>
+        <p:spPr>
+          <a:xfrm>
+            <a:off x="898636" y="125980"/>
+            <a:ext cx="7491124" cy="1126229"/>
+          </a:xfrm>
+        </p:spPr>
+        <p:txBody>
+          <a:bodyPr anchor="b">
+            <a:normAutofit fontScale="90000"/>
+          </a:bodyPr>
+          <a:lstStyle/>
+          <a:p>
+            <a:r>
+              <a:rPr lang="en-US"/>
+              <a:t>Address Space Layout Randomization (ASLR)</a:t>
+            </a:r>
+          </a:p>
+        </p:txBody>
+      </p:sp>
+      <p:graphicFrame>
+        <p:nvGraphicFramePr>
+          <p:cNvPr id="97" name="Content Placeholder 2">
+            <a:extLst>
+              <a:ext uri="{FF2B5EF4-FFF2-40B4-BE49-F238E27FC236}">
+                <a16:creationId xmlns:a16="http://schemas.microsoft.com/office/drawing/2014/main" id="{C57EF78C-8440-4A73-84EF-EBEAEE1365C9}"/>
+              </a:ext>
+            </a:extLst>
+          </p:cNvPr>
+          <p:cNvGraphicFramePr>
+            <a:graphicFrameLocks noGrp="1"/>
+          </p:cNvGraphicFramePr>
+          <p:nvPr>
+            <p:ph idx="1"/>
+          </p:nvPr>
+        </p:nvGraphicFramePr>
+        <p:xfrm>
+          <a:off x="628650" y="1486626"/>
+          <a:ext cx="7886700" cy="3146096"/>
+        </p:xfrm>
+        <a:graphic>
+          <a:graphicData uri="http://schemas.openxmlformats.org/drawingml/2006/diagram">
+            <dgm:relIds xmlns:dgm="http://schemas.openxmlformats.org/drawingml/2006/diagram" xmlns:r="http://schemas.openxmlformats.org/officeDocument/2006/relationships" r:dm="rId2" r:lo="rId3" r:qs="rId4" r:cs="rId5"/>
+          </a:graphicData>
+        </a:graphic>
+      </p:graphicFrame>
+    </p:spTree>
+    <p:extLst>
+      <p:ext uri="{BB962C8B-B14F-4D97-AF65-F5344CB8AC3E}">
+        <p14:creationId xmlns:p14="http://schemas.microsoft.com/office/powerpoint/2010/main" val="1628456243"/>
+      </p:ext>
+    </p:extLst>
+  </p:cSld>
+  <p:clrMapOvr>
+    <a:masterClrMapping/>
+  </p:clrMapOvr>
+</p:sld>
+</file>
+
+<file path=ppt/slides/slide40.xml><?xml version="1.0" encoding="utf-8"?>
 <p:sld xmlns:a="http://schemas.openxmlformats.org/drawingml/2006/main" xmlns:r="http://schemas.openxmlformats.org/officeDocument/2006/relationships" xmlns:p="http://schemas.openxmlformats.org/presentationml/2006/main">
   <p:cSld>
     <p:spTree>
@@ -49469,98 +49699,7 @@
 </p:sld>
 </file>
 
-<file path=ppt/slides/slide4.xml><?xml version="1.0" encoding="utf-8"?>
-<p:sld xmlns:a="http://schemas.openxmlformats.org/drawingml/2006/main" xmlns:r="http://schemas.openxmlformats.org/officeDocument/2006/relationships" xmlns:p="http://schemas.openxmlformats.org/presentationml/2006/main">
-  <p:cSld>
-    <p:spTree>
-      <p:nvGrpSpPr>
-        <p:cNvPr id="1" name=""/>
-        <p:cNvGrpSpPr/>
-        <p:nvPr/>
-      </p:nvGrpSpPr>
-      <p:grpSpPr>
-        <a:xfrm>
-          <a:off x="0" y="0"/>
-          <a:ext cx="0" cy="0"/>
-          <a:chOff x="0" y="0"/>
-          <a:chExt cx="0" cy="0"/>
-        </a:xfrm>
-      </p:grpSpPr>
-      <p:sp>
-        <p:nvSpPr>
-          <p:cNvPr id="2" name="Title 1">
-            <a:extLst>
-              <a:ext uri="{FF2B5EF4-FFF2-40B4-BE49-F238E27FC236}">
-                <a16:creationId xmlns:a16="http://schemas.microsoft.com/office/drawing/2014/main" id="{1BDD0254-2F5D-5D4C-A0D7-2421174D5BB2}"/>
-              </a:ext>
-            </a:extLst>
-          </p:cNvPr>
-          <p:cNvSpPr>
-            <a:spLocks noGrp="1"/>
-          </p:cNvSpPr>
-          <p:nvPr>
-            <p:ph type="title"/>
-          </p:nvPr>
-        </p:nvSpPr>
-        <p:spPr>
-          <a:xfrm>
-            <a:off x="898636" y="125980"/>
-            <a:ext cx="7491124" cy="1126229"/>
-          </a:xfrm>
-        </p:spPr>
-        <p:txBody>
-          <a:bodyPr anchor="b">
-            <a:normAutofit fontScale="90000"/>
-          </a:bodyPr>
-          <a:lstStyle/>
-          <a:p>
-            <a:r>
-              <a:rPr lang="en-US"/>
-              <a:t>Address Space Layout Randomization (ASLR)</a:t>
-            </a:r>
-          </a:p>
-        </p:txBody>
-      </p:sp>
-      <p:graphicFrame>
-        <p:nvGraphicFramePr>
-          <p:cNvPr id="97" name="Content Placeholder 2">
-            <a:extLst>
-              <a:ext uri="{FF2B5EF4-FFF2-40B4-BE49-F238E27FC236}">
-                <a16:creationId xmlns:a16="http://schemas.microsoft.com/office/drawing/2014/main" id="{C57EF78C-8440-4A73-84EF-EBEAEE1365C9}"/>
-              </a:ext>
-            </a:extLst>
-          </p:cNvPr>
-          <p:cNvGraphicFramePr>
-            <a:graphicFrameLocks noGrp="1"/>
-          </p:cNvGraphicFramePr>
-          <p:nvPr>
-            <p:ph idx="1"/>
-          </p:nvPr>
-        </p:nvGraphicFramePr>
-        <p:xfrm>
-          <a:off x="628650" y="1486626"/>
-          <a:ext cx="7886700" cy="3146096"/>
-        </p:xfrm>
-        <a:graphic>
-          <a:graphicData uri="http://schemas.openxmlformats.org/drawingml/2006/diagram">
-            <dgm:relIds xmlns:dgm="http://schemas.openxmlformats.org/drawingml/2006/diagram" xmlns:r="http://schemas.openxmlformats.org/officeDocument/2006/relationships" r:dm="rId2" r:lo="rId3" r:qs="rId4" r:cs="rId5"/>
-          </a:graphicData>
-        </a:graphic>
-      </p:graphicFrame>
-    </p:spTree>
-    <p:extLst>
-      <p:ext uri="{BB962C8B-B14F-4D97-AF65-F5344CB8AC3E}">
-        <p14:creationId xmlns:p14="http://schemas.microsoft.com/office/powerpoint/2010/main" val="1628456243"/>
-      </p:ext>
-    </p:extLst>
-  </p:cSld>
-  <p:clrMapOvr>
-    <a:masterClrMapping/>
-  </p:clrMapOvr>
-</p:sld>
-</file>
-
-<file path=ppt/slides/slide40.xml><?xml version="1.0" encoding="utf-8"?>
+<file path=ppt/slides/slide41.xml><?xml version="1.0" encoding="utf-8"?>
 <p:sld xmlns:a="http://schemas.openxmlformats.org/drawingml/2006/main" xmlns:r="http://schemas.openxmlformats.org/officeDocument/2006/relationships" xmlns:p="http://schemas.openxmlformats.org/presentationml/2006/main">
   <p:cSld>
     <p:spTree>
@@ -49752,7 +49891,7 @@
 </p:sld>
 </file>
 
-<file path=ppt/slides/slide41.xml><?xml version="1.0" encoding="utf-8"?>
+<file path=ppt/slides/slide42.xml><?xml version="1.0" encoding="utf-8"?>
 <p:sld xmlns:a="http://schemas.openxmlformats.org/drawingml/2006/main" xmlns:r="http://schemas.openxmlformats.org/officeDocument/2006/relationships" xmlns:p="http://schemas.openxmlformats.org/presentationml/2006/main">
   <p:cSld>
     <p:spTree>
@@ -49838,7 +49977,7 @@
 </p:sld>
 </file>
 
-<file path=ppt/slides/slide42.xml><?xml version="1.0" encoding="utf-8"?>
+<file path=ppt/slides/slide43.xml><?xml version="1.0" encoding="utf-8"?>
 <p:sld xmlns:a="http://schemas.openxmlformats.org/drawingml/2006/main" xmlns:r="http://schemas.openxmlformats.org/officeDocument/2006/relationships" xmlns:p="http://schemas.openxmlformats.org/presentationml/2006/main">
   <p:cSld>
     <p:spTree>
@@ -49921,7 +50060,7 @@
 </p:sld>
 </file>
 
-<file path=ppt/slides/slide43.xml><?xml version="1.0" encoding="utf-8"?>
+<file path=ppt/slides/slide44.xml><?xml version="1.0" encoding="utf-8"?>
 <p:sld xmlns:a="http://schemas.openxmlformats.org/drawingml/2006/main" xmlns:r="http://schemas.openxmlformats.org/officeDocument/2006/relationships" xmlns:p="http://schemas.openxmlformats.org/presentationml/2006/main">
   <p:cSld>
     <p:spTree>
@@ -50004,7 +50143,7 @@
 </p:sld>
 </file>
 
-<file path=ppt/slides/slide44.xml><?xml version="1.0" encoding="utf-8"?>
+<file path=ppt/slides/slide45.xml><?xml version="1.0" encoding="utf-8"?>
 <p:sld xmlns:a="http://schemas.openxmlformats.org/drawingml/2006/main" xmlns:r="http://schemas.openxmlformats.org/officeDocument/2006/relationships" xmlns:p="http://schemas.openxmlformats.org/presentationml/2006/main">
   <p:cSld>
     <p:spTree>
@@ -50089,7 +50228,7 @@
 </p:sld>
 </file>
 
-<file path=ppt/slides/slide45.xml><?xml version="1.0" encoding="utf-8"?>
+<file path=ppt/slides/slide46.xml><?xml version="1.0" encoding="utf-8"?>
 <p:sld xmlns:a="http://schemas.openxmlformats.org/drawingml/2006/main" xmlns:r="http://schemas.openxmlformats.org/officeDocument/2006/relationships" xmlns:p="http://schemas.openxmlformats.org/presentationml/2006/main">
   <p:cSld>
     <p:spTree>

</xml_diff>